<commit_message>
trying to commit by skipping the staging area
</commit_message>
<xml_diff>
--- a/ppt.pptx
+++ b/ppt.pptx
@@ -104,6 +104,11 @@
       </a:defRPr>
     </a:lvl9pPr>
   </p:defaultTextStyle>
+  <p:extLst>
+    <p:ext uri="{EFAFB233-063F-42B5-8137-9DF3F51BA10A}">
+      <p15:sldGuideLst xmlns:p15="http://schemas.microsoft.com/office/powerpoint/2012/main"/>
+    </p:ext>
+  </p:extLst>
 </p:presentation>
 </file>
 
@@ -254,7 +259,7 @@
           <a:p>
             <a:fld id="{6E5B4EC0-E36E-47D8-8AAC-969BD7592531}" type="datetimeFigureOut">
               <a:rPr lang="en-US" smtClean="0"/>
-              <a:t>6/25/2022</a:t>
+              <a:t>6/26/2022</a:t>
             </a:fld>
             <a:endParaRPr lang="en-US"/>
           </a:p>
@@ -452,7 +457,7 @@
           <a:p>
             <a:fld id="{6E5B4EC0-E36E-47D8-8AAC-969BD7592531}" type="datetimeFigureOut">
               <a:rPr lang="en-US" smtClean="0"/>
-              <a:t>6/25/2022</a:t>
+              <a:t>6/26/2022</a:t>
             </a:fld>
             <a:endParaRPr lang="en-US"/>
           </a:p>
@@ -660,7 +665,7 @@
           <a:p>
             <a:fld id="{6E5B4EC0-E36E-47D8-8AAC-969BD7592531}" type="datetimeFigureOut">
               <a:rPr lang="en-US" smtClean="0"/>
-              <a:t>6/25/2022</a:t>
+              <a:t>6/26/2022</a:t>
             </a:fld>
             <a:endParaRPr lang="en-US"/>
           </a:p>
@@ -858,7 +863,7 @@
           <a:p>
             <a:fld id="{6E5B4EC0-E36E-47D8-8AAC-969BD7592531}" type="datetimeFigureOut">
               <a:rPr lang="en-US" smtClean="0"/>
-              <a:t>6/25/2022</a:t>
+              <a:t>6/26/2022</a:t>
             </a:fld>
             <a:endParaRPr lang="en-US"/>
           </a:p>
@@ -1133,7 +1138,7 @@
           <a:p>
             <a:fld id="{6E5B4EC0-E36E-47D8-8AAC-969BD7592531}" type="datetimeFigureOut">
               <a:rPr lang="en-US" smtClean="0"/>
-              <a:t>6/25/2022</a:t>
+              <a:t>6/26/2022</a:t>
             </a:fld>
             <a:endParaRPr lang="en-US"/>
           </a:p>
@@ -1398,7 +1403,7 @@
           <a:p>
             <a:fld id="{6E5B4EC0-E36E-47D8-8AAC-969BD7592531}" type="datetimeFigureOut">
               <a:rPr lang="en-US" smtClean="0"/>
-              <a:t>6/25/2022</a:t>
+              <a:t>6/26/2022</a:t>
             </a:fld>
             <a:endParaRPr lang="en-US"/>
           </a:p>
@@ -1810,7 +1815,7 @@
           <a:p>
             <a:fld id="{6E5B4EC0-E36E-47D8-8AAC-969BD7592531}" type="datetimeFigureOut">
               <a:rPr lang="en-US" smtClean="0"/>
-              <a:t>6/25/2022</a:t>
+              <a:t>6/26/2022</a:t>
             </a:fld>
             <a:endParaRPr lang="en-US"/>
           </a:p>
@@ -1951,7 +1956,7 @@
           <a:p>
             <a:fld id="{6E5B4EC0-E36E-47D8-8AAC-969BD7592531}" type="datetimeFigureOut">
               <a:rPr lang="en-US" smtClean="0"/>
-              <a:t>6/25/2022</a:t>
+              <a:t>6/26/2022</a:t>
             </a:fld>
             <a:endParaRPr lang="en-US"/>
           </a:p>
@@ -2064,7 +2069,7 @@
           <a:p>
             <a:fld id="{6E5B4EC0-E36E-47D8-8AAC-969BD7592531}" type="datetimeFigureOut">
               <a:rPr lang="en-US" smtClean="0"/>
-              <a:t>6/25/2022</a:t>
+              <a:t>6/26/2022</a:t>
             </a:fld>
             <a:endParaRPr lang="en-US"/>
           </a:p>
@@ -2375,7 +2380,7 @@
           <a:p>
             <a:fld id="{6E5B4EC0-E36E-47D8-8AAC-969BD7592531}" type="datetimeFigureOut">
               <a:rPr lang="en-US" smtClean="0"/>
-              <a:t>6/25/2022</a:t>
+              <a:t>6/26/2022</a:t>
             </a:fld>
             <a:endParaRPr lang="en-US"/>
           </a:p>
@@ -2663,7 +2668,7 @@
           <a:p>
             <a:fld id="{6E5B4EC0-E36E-47D8-8AAC-969BD7592531}" type="datetimeFigureOut">
               <a:rPr lang="en-US" smtClean="0"/>
-              <a:t>6/25/2022</a:t>
+              <a:t>6/26/2022</a:t>
             </a:fld>
             <a:endParaRPr lang="en-US"/>
           </a:p>
@@ -2904,7 +2909,7 @@
           <a:p>
             <a:fld id="{6E5B4EC0-E36E-47D8-8AAC-969BD7592531}" type="datetimeFigureOut">
               <a:rPr lang="en-US" smtClean="0"/>
-              <a:t>6/25/2022</a:t>
+              <a:t>6/26/2022</a:t>
             </a:fld>
             <a:endParaRPr lang="en-US"/>
           </a:p>
@@ -3367,10 +3372,61 @@
         </p:nvSpPr>
         <p:spPr/>
         <p:txBody>
-          <a:bodyPr/>
-          <a:lstStyle/>
-          <a:p>
-            <a:endParaRPr lang="en-US"/>
+          <a:bodyPr>
+            <a:normAutofit fontScale="40000" lnSpcReduction="20000"/>
+          </a:bodyPr>
+          <a:lstStyle/>
+          <a:p>
+            <a:r>
+              <a:rPr lang="en-US" dirty="0" err="1"/>
+              <a:t>Reergf</a:t>
+            </a:r>
+            <a:r>
+              <a:rPr lang="en-US" dirty="0"/>
+              <a:t> 8wgf8qf</a:t>
+            </a:r>
+          </a:p>
+          <a:p>
+            <a:r>
+              <a:rPr lang="en-US" dirty="0" err="1"/>
+              <a:t>Vwweiwg</a:t>
+            </a:r>
+            <a:endParaRPr lang="en-US" dirty="0"/>
+          </a:p>
+          <a:p>
+            <a:r>
+              <a:rPr lang="en-US" dirty="0" err="1"/>
+              <a:t>Ouewgwg</a:t>
+            </a:r>
+            <a:endParaRPr lang="en-US" dirty="0"/>
+          </a:p>
+          <a:p>
+            <a:r>
+              <a:rPr lang="en-US" dirty="0" err="1"/>
+              <a:t>Wobeiugweg</a:t>
+            </a:r>
+            <a:endParaRPr lang="en-US" dirty="0"/>
+          </a:p>
+          <a:p>
+            <a:r>
+              <a:rPr lang="en-US" dirty="0" err="1"/>
+              <a:t>Ohouewg</a:t>
+            </a:r>
+            <a:endParaRPr lang="en-US" dirty="0"/>
+          </a:p>
+          <a:p>
+            <a:r>
+              <a:rPr lang="en-US" dirty="0" err="1"/>
+              <a:t>Oiihoweug</a:t>
+            </a:r>
+            <a:endParaRPr lang="en-US" dirty="0"/>
+          </a:p>
+          <a:p>
+            <a:r>
+              <a:rPr lang="en-US"/>
+              <a:t>pwiheoewgvwrwg</a:t>
+            </a:r>
+            <a:endParaRPr lang="en-US" dirty="0"/>
           </a:p>
         </p:txBody>
       </p:sp>

</xml_diff>

<commit_message>
this is the new change
</commit_message>
<xml_diff>
--- a/ppt.pptx
+++ b/ppt.pptx
@@ -3370,10 +3370,15 @@
             <p:ph type="subTitle" idx="1"/>
           </p:nvPr>
         </p:nvSpPr>
-        <p:spPr/>
+        <p:spPr>
+          <a:xfrm>
+            <a:off x="1524000" y="3602038"/>
+            <a:ext cx="9144000" cy="2504848"/>
+          </a:xfrm>
+        </p:spPr>
         <p:txBody>
           <a:bodyPr>
-            <a:normAutofit fontScale="40000" lnSpcReduction="20000"/>
+            <a:normAutofit fontScale="85000" lnSpcReduction="20000"/>
           </a:bodyPr>
           <a:lstStyle/>
           <a:p>
@@ -3423,9 +3428,11 @@
           </a:p>
           <a:p>
             <a:r>
-              <a:rPr lang="en-US"/>
-              <a:t>pwiheoewgvwrwg</a:t>
-            </a:r>
+              <a:rPr lang="en-US" dirty="0"/>
+              <a:t>New commit</a:t>
+            </a:r>
+          </a:p>
+          <a:p>
             <a:endParaRPr lang="en-US" dirty="0"/>
           </a:p>
         </p:txBody>

</xml_diff>